<commit_message>
Adds better how to texts, adds inline sprites, adds inline colors
</commit_message>
<xml_diff>
--- a/RawAssets/TempAssetCreator.pptx
+++ b/RawAssets/TempAssetCreator.pptx
@@ -6,6 +6,7 @@
   </p:sldMasterIdLst>
   <p:sldIdLst>
     <p:sldId id="256" r:id="rId2"/>
+    <p:sldId id="257" r:id="rId3"/>
   </p:sldIdLst>
   <p:sldSz cx="12192000" cy="6858000"/>
   <p:notesSz cx="6858000" cy="9144000"/>
@@ -104,6 +105,11 @@
       </a:defRPr>
     </a:lvl9pPr>
   </p:defaultTextStyle>
+  <p:extLst>
+    <p:ext uri="{EFAFB233-063F-42B5-8137-9DF3F51BA10A}">
+      <p15:sldGuideLst xmlns:p15="http://schemas.microsoft.com/office/powerpoint/2012/main"/>
+    </p:ext>
+  </p:extLst>
 </p:presentation>
 </file>
 
@@ -256,7 +262,7 @@
           <a:p>
             <a:fld id="{3858AF2B-364E-4116-ADCD-6659B5EA8CF2}" type="datetimeFigureOut">
               <a:rPr lang="en-DE" smtClean="0"/>
-              <a:t>19/08/2019</a:t>
+              <a:t>07/04/2021</a:t>
             </a:fld>
             <a:endParaRPr lang="en-DE"/>
           </a:p>
@@ -456,7 +462,7 @@
           <a:p>
             <a:fld id="{3858AF2B-364E-4116-ADCD-6659B5EA8CF2}" type="datetimeFigureOut">
               <a:rPr lang="en-DE" smtClean="0"/>
-              <a:t>19/08/2019</a:t>
+              <a:t>07/04/2021</a:t>
             </a:fld>
             <a:endParaRPr lang="en-DE"/>
           </a:p>
@@ -666,7 +672,7 @@
           <a:p>
             <a:fld id="{3858AF2B-364E-4116-ADCD-6659B5EA8CF2}" type="datetimeFigureOut">
               <a:rPr lang="en-DE" smtClean="0"/>
-              <a:t>19/08/2019</a:t>
+              <a:t>07/04/2021</a:t>
             </a:fld>
             <a:endParaRPr lang="en-DE"/>
           </a:p>
@@ -866,7 +872,7 @@
           <a:p>
             <a:fld id="{3858AF2B-364E-4116-ADCD-6659B5EA8CF2}" type="datetimeFigureOut">
               <a:rPr lang="en-DE" smtClean="0"/>
-              <a:t>19/08/2019</a:t>
+              <a:t>07/04/2021</a:t>
             </a:fld>
             <a:endParaRPr lang="en-DE"/>
           </a:p>
@@ -1142,7 +1148,7 @@
           <a:p>
             <a:fld id="{3858AF2B-364E-4116-ADCD-6659B5EA8CF2}" type="datetimeFigureOut">
               <a:rPr lang="en-DE" smtClean="0"/>
-              <a:t>19/08/2019</a:t>
+              <a:t>07/04/2021</a:t>
             </a:fld>
             <a:endParaRPr lang="en-DE"/>
           </a:p>
@@ -1410,7 +1416,7 @@
           <a:p>
             <a:fld id="{3858AF2B-364E-4116-ADCD-6659B5EA8CF2}" type="datetimeFigureOut">
               <a:rPr lang="en-DE" smtClean="0"/>
-              <a:t>19/08/2019</a:t>
+              <a:t>07/04/2021</a:t>
             </a:fld>
             <a:endParaRPr lang="en-DE"/>
           </a:p>
@@ -1825,7 +1831,7 @@
           <a:p>
             <a:fld id="{3858AF2B-364E-4116-ADCD-6659B5EA8CF2}" type="datetimeFigureOut">
               <a:rPr lang="en-DE" smtClean="0"/>
-              <a:t>19/08/2019</a:t>
+              <a:t>07/04/2021</a:t>
             </a:fld>
             <a:endParaRPr lang="en-DE"/>
           </a:p>
@@ -1967,7 +1973,7 @@
           <a:p>
             <a:fld id="{3858AF2B-364E-4116-ADCD-6659B5EA8CF2}" type="datetimeFigureOut">
               <a:rPr lang="en-DE" smtClean="0"/>
-              <a:t>19/08/2019</a:t>
+              <a:t>07/04/2021</a:t>
             </a:fld>
             <a:endParaRPr lang="en-DE"/>
           </a:p>
@@ -2080,7 +2086,7 @@
           <a:p>
             <a:fld id="{3858AF2B-364E-4116-ADCD-6659B5EA8CF2}" type="datetimeFigureOut">
               <a:rPr lang="en-DE" smtClean="0"/>
-              <a:t>19/08/2019</a:t>
+              <a:t>07/04/2021</a:t>
             </a:fld>
             <a:endParaRPr lang="en-DE"/>
           </a:p>
@@ -2393,7 +2399,7 @@
           <a:p>
             <a:fld id="{3858AF2B-364E-4116-ADCD-6659B5EA8CF2}" type="datetimeFigureOut">
               <a:rPr lang="en-DE" smtClean="0"/>
-              <a:t>19/08/2019</a:t>
+              <a:t>07/04/2021</a:t>
             </a:fld>
             <a:endParaRPr lang="en-DE"/>
           </a:p>
@@ -2682,7 +2688,7 @@
           <a:p>
             <a:fld id="{3858AF2B-364E-4116-ADCD-6659B5EA8CF2}" type="datetimeFigureOut">
               <a:rPr lang="en-DE" smtClean="0"/>
-              <a:t>19/08/2019</a:t>
+              <a:t>07/04/2021</a:t>
             </a:fld>
             <a:endParaRPr lang="en-DE"/>
           </a:p>
@@ -2925,7 +2931,7 @@
           <a:p>
             <a:fld id="{3858AF2B-364E-4116-ADCD-6659B5EA8CF2}" type="datetimeFigureOut">
               <a:rPr lang="en-DE" smtClean="0"/>
-              <a:t>19/08/2019</a:t>
+              <a:t>07/04/2021</a:t>
             </a:fld>
             <a:endParaRPr lang="en-DE"/>
           </a:p>
@@ -3506,10 +3512,750 @@
           </a:p>
         </p:txBody>
       </p:sp>
+      <p:grpSp>
+        <p:nvGrpSpPr>
+          <p:cNvPr id="3" name="Group 2">
+            <a:extLst>
+              <a:ext uri="{FF2B5EF4-FFF2-40B4-BE49-F238E27FC236}">
+                <a16:creationId xmlns:a16="http://schemas.microsoft.com/office/drawing/2014/main" id="{1E55A065-6515-4EC2-836C-08CB981FB372}"/>
+              </a:ext>
+            </a:extLst>
+          </p:cNvPr>
+          <p:cNvGrpSpPr/>
+          <p:nvPr/>
+        </p:nvGrpSpPr>
+        <p:grpSpPr>
+          <a:xfrm>
+            <a:off x="5071658" y="5504758"/>
+            <a:ext cx="360000" cy="360000"/>
+            <a:chOff x="4854572" y="5513244"/>
+            <a:chExt cx="360000" cy="360000"/>
+          </a:xfrm>
+        </p:grpSpPr>
+        <p:sp>
+          <p:nvSpPr>
+            <p:cNvPr id="7" name="Rectangle: Rounded Corners 6">
+              <a:extLst>
+                <a:ext uri="{FF2B5EF4-FFF2-40B4-BE49-F238E27FC236}">
+                  <a16:creationId xmlns:a16="http://schemas.microsoft.com/office/drawing/2014/main" id="{5F039B0F-2EAC-4344-B646-3ECAEC17D23C}"/>
+                </a:ext>
+              </a:extLst>
+            </p:cNvPr>
+            <p:cNvSpPr/>
+            <p:nvPr/>
+          </p:nvSpPr>
+          <p:spPr>
+            <a:xfrm>
+              <a:off x="4854572" y="5513244"/>
+              <a:ext cx="360000" cy="360000"/>
+            </a:xfrm>
+            <a:prstGeom prst="roundRect">
+              <a:avLst>
+                <a:gd name="adj" fmla="val 7384"/>
+              </a:avLst>
+            </a:prstGeom>
+            <a:noFill/>
+            <a:ln w="57150">
+              <a:solidFill>
+                <a:srgbClr val="2EB9F7"/>
+              </a:solidFill>
+            </a:ln>
+          </p:spPr>
+          <p:style>
+            <a:lnRef idx="2">
+              <a:schemeClr val="accent1">
+                <a:shade val="50000"/>
+              </a:schemeClr>
+            </a:lnRef>
+            <a:fillRef idx="1">
+              <a:schemeClr val="accent1"/>
+            </a:fillRef>
+            <a:effectRef idx="0">
+              <a:schemeClr val="accent1"/>
+            </a:effectRef>
+            <a:fontRef idx="minor">
+              <a:schemeClr val="lt1"/>
+            </a:fontRef>
+          </p:style>
+          <p:txBody>
+            <a:bodyPr rtlCol="0" anchor="ctr"/>
+            <a:lstStyle/>
+            <a:p>
+              <a:pPr algn="ctr"/>
+              <a:endParaRPr lang="en-DE"/>
+            </a:p>
+          </p:txBody>
+        </p:sp>
+        <p:sp>
+          <p:nvSpPr>
+            <p:cNvPr id="2" name="Arrow: Down 1">
+              <a:extLst>
+                <a:ext uri="{FF2B5EF4-FFF2-40B4-BE49-F238E27FC236}">
+                  <a16:creationId xmlns:a16="http://schemas.microsoft.com/office/drawing/2014/main" id="{4367C294-8A9D-490C-BF9D-CFC8962BDE32}"/>
+                </a:ext>
+              </a:extLst>
+            </p:cNvPr>
+            <p:cNvSpPr/>
+            <p:nvPr/>
+          </p:nvSpPr>
+          <p:spPr>
+            <a:xfrm rot="10800000">
+              <a:off x="4951315" y="5568166"/>
+              <a:ext cx="166513" cy="250155"/>
+            </a:xfrm>
+            <a:prstGeom prst="downArrow">
+              <a:avLst>
+                <a:gd name="adj1" fmla="val 33125"/>
+                <a:gd name="adj2" fmla="val 86898"/>
+              </a:avLst>
+            </a:prstGeom>
+            <a:solidFill>
+              <a:srgbClr val="2EB9F7"/>
+            </a:solidFill>
+            <a:ln>
+              <a:noFill/>
+            </a:ln>
+          </p:spPr>
+          <p:style>
+            <a:lnRef idx="2">
+              <a:schemeClr val="accent1">
+                <a:shade val="50000"/>
+              </a:schemeClr>
+            </a:lnRef>
+            <a:fillRef idx="1">
+              <a:schemeClr val="accent1"/>
+            </a:fillRef>
+            <a:effectRef idx="0">
+              <a:schemeClr val="accent1"/>
+            </a:effectRef>
+            <a:fontRef idx="minor">
+              <a:schemeClr val="lt1"/>
+            </a:fontRef>
+          </p:style>
+          <p:txBody>
+            <a:bodyPr rtlCol="0" anchor="ctr"/>
+            <a:lstStyle/>
+            <a:p>
+              <a:pPr algn="ctr"/>
+              <a:endParaRPr lang="en-DE"/>
+            </a:p>
+          </p:txBody>
+        </p:sp>
+      </p:grpSp>
+      <p:grpSp>
+        <p:nvGrpSpPr>
+          <p:cNvPr id="14" name="Group 13">
+            <a:extLst>
+              <a:ext uri="{FF2B5EF4-FFF2-40B4-BE49-F238E27FC236}">
+                <a16:creationId xmlns:a16="http://schemas.microsoft.com/office/drawing/2014/main" id="{5817DFDC-0C7B-4218-BD1E-1173B4E7D1B4}"/>
+              </a:ext>
+            </a:extLst>
+          </p:cNvPr>
+          <p:cNvGrpSpPr/>
+          <p:nvPr/>
+        </p:nvGrpSpPr>
+        <p:grpSpPr>
+          <a:xfrm>
+            <a:off x="5517089" y="5504758"/>
+            <a:ext cx="360000" cy="360000"/>
+            <a:chOff x="5401307" y="5513244"/>
+            <a:chExt cx="360000" cy="360000"/>
+          </a:xfrm>
+        </p:grpSpPr>
+        <p:sp>
+          <p:nvSpPr>
+            <p:cNvPr id="8" name="Rectangle: Rounded Corners 7">
+              <a:extLst>
+                <a:ext uri="{FF2B5EF4-FFF2-40B4-BE49-F238E27FC236}">
+                  <a16:creationId xmlns:a16="http://schemas.microsoft.com/office/drawing/2014/main" id="{F92F237A-95EC-45CA-9518-6DE9D9EA27C3}"/>
+                </a:ext>
+              </a:extLst>
+            </p:cNvPr>
+            <p:cNvSpPr/>
+            <p:nvPr/>
+          </p:nvSpPr>
+          <p:spPr>
+            <a:xfrm>
+              <a:off x="5401307" y="5513244"/>
+              <a:ext cx="360000" cy="360000"/>
+            </a:xfrm>
+            <a:prstGeom prst="roundRect">
+              <a:avLst>
+                <a:gd name="adj" fmla="val 7384"/>
+              </a:avLst>
+            </a:prstGeom>
+            <a:noFill/>
+            <a:ln w="57150">
+              <a:solidFill>
+                <a:srgbClr val="2EB9F7"/>
+              </a:solidFill>
+            </a:ln>
+          </p:spPr>
+          <p:style>
+            <a:lnRef idx="2">
+              <a:schemeClr val="accent1">
+                <a:shade val="50000"/>
+              </a:schemeClr>
+            </a:lnRef>
+            <a:fillRef idx="1">
+              <a:schemeClr val="accent1"/>
+            </a:fillRef>
+            <a:effectRef idx="0">
+              <a:schemeClr val="accent1"/>
+            </a:effectRef>
+            <a:fontRef idx="minor">
+              <a:schemeClr val="lt1"/>
+            </a:fontRef>
+          </p:style>
+          <p:txBody>
+            <a:bodyPr rtlCol="0" anchor="ctr"/>
+            <a:lstStyle/>
+            <a:p>
+              <a:pPr algn="ctr"/>
+              <a:endParaRPr lang="en-DE"/>
+            </a:p>
+          </p:txBody>
+        </p:sp>
+        <p:sp>
+          <p:nvSpPr>
+            <p:cNvPr id="9" name="Arrow: Down 8">
+              <a:extLst>
+                <a:ext uri="{FF2B5EF4-FFF2-40B4-BE49-F238E27FC236}">
+                  <a16:creationId xmlns:a16="http://schemas.microsoft.com/office/drawing/2014/main" id="{C061D0E3-4FDC-4064-903A-299EA3D20D3B}"/>
+                </a:ext>
+              </a:extLst>
+            </p:cNvPr>
+            <p:cNvSpPr/>
+            <p:nvPr/>
+          </p:nvSpPr>
+          <p:spPr>
+            <a:xfrm>
+              <a:off x="5498050" y="5568166"/>
+              <a:ext cx="166513" cy="250155"/>
+            </a:xfrm>
+            <a:prstGeom prst="downArrow">
+              <a:avLst>
+                <a:gd name="adj1" fmla="val 33125"/>
+                <a:gd name="adj2" fmla="val 86898"/>
+              </a:avLst>
+            </a:prstGeom>
+            <a:solidFill>
+              <a:srgbClr val="2EB9F7"/>
+            </a:solidFill>
+            <a:ln>
+              <a:noFill/>
+            </a:ln>
+          </p:spPr>
+          <p:style>
+            <a:lnRef idx="2">
+              <a:schemeClr val="accent1">
+                <a:shade val="50000"/>
+              </a:schemeClr>
+            </a:lnRef>
+            <a:fillRef idx="1">
+              <a:schemeClr val="accent1"/>
+            </a:fillRef>
+            <a:effectRef idx="0">
+              <a:schemeClr val="accent1"/>
+            </a:effectRef>
+            <a:fontRef idx="minor">
+              <a:schemeClr val="lt1"/>
+            </a:fontRef>
+          </p:style>
+          <p:txBody>
+            <a:bodyPr rtlCol="0" anchor="ctr"/>
+            <a:lstStyle/>
+            <a:p>
+              <a:pPr algn="ctr"/>
+              <a:endParaRPr lang="en-DE"/>
+            </a:p>
+          </p:txBody>
+        </p:sp>
+      </p:grpSp>
+      <p:grpSp>
+        <p:nvGrpSpPr>
+          <p:cNvPr id="15" name="Group 14">
+            <a:extLst>
+              <a:ext uri="{FF2B5EF4-FFF2-40B4-BE49-F238E27FC236}">
+                <a16:creationId xmlns:a16="http://schemas.microsoft.com/office/drawing/2014/main" id="{D903E5C1-0470-401C-B6BC-89053FEEB634}"/>
+              </a:ext>
+            </a:extLst>
+          </p:cNvPr>
+          <p:cNvGrpSpPr/>
+          <p:nvPr/>
+        </p:nvGrpSpPr>
+        <p:grpSpPr>
+          <a:xfrm>
+            <a:off x="5962519" y="5504758"/>
+            <a:ext cx="360000" cy="360000"/>
+            <a:chOff x="5948042" y="5513244"/>
+            <a:chExt cx="360000" cy="360000"/>
+          </a:xfrm>
+        </p:grpSpPr>
+        <p:sp>
+          <p:nvSpPr>
+            <p:cNvPr id="10" name="Rectangle: Rounded Corners 9">
+              <a:extLst>
+                <a:ext uri="{FF2B5EF4-FFF2-40B4-BE49-F238E27FC236}">
+                  <a16:creationId xmlns:a16="http://schemas.microsoft.com/office/drawing/2014/main" id="{7A64F97C-410A-40CB-9AA5-E9374422EFB8}"/>
+                </a:ext>
+              </a:extLst>
+            </p:cNvPr>
+            <p:cNvSpPr/>
+            <p:nvPr/>
+          </p:nvSpPr>
+          <p:spPr>
+            <a:xfrm>
+              <a:off x="5948042" y="5513244"/>
+              <a:ext cx="360000" cy="360000"/>
+            </a:xfrm>
+            <a:prstGeom prst="roundRect">
+              <a:avLst>
+                <a:gd name="adj" fmla="val 7384"/>
+              </a:avLst>
+            </a:prstGeom>
+            <a:noFill/>
+            <a:ln w="57150">
+              <a:solidFill>
+                <a:srgbClr val="2EB9F7"/>
+              </a:solidFill>
+            </a:ln>
+          </p:spPr>
+          <p:style>
+            <a:lnRef idx="2">
+              <a:schemeClr val="accent1">
+                <a:shade val="50000"/>
+              </a:schemeClr>
+            </a:lnRef>
+            <a:fillRef idx="1">
+              <a:schemeClr val="accent1"/>
+            </a:fillRef>
+            <a:effectRef idx="0">
+              <a:schemeClr val="accent1"/>
+            </a:effectRef>
+            <a:fontRef idx="minor">
+              <a:schemeClr val="lt1"/>
+            </a:fontRef>
+          </p:style>
+          <p:txBody>
+            <a:bodyPr rtlCol="0" anchor="ctr"/>
+            <a:lstStyle/>
+            <a:p>
+              <a:pPr algn="ctr"/>
+              <a:endParaRPr lang="en-DE"/>
+            </a:p>
+          </p:txBody>
+        </p:sp>
+        <p:sp>
+          <p:nvSpPr>
+            <p:cNvPr id="11" name="Arrow: Down 10">
+              <a:extLst>
+                <a:ext uri="{FF2B5EF4-FFF2-40B4-BE49-F238E27FC236}">
+                  <a16:creationId xmlns:a16="http://schemas.microsoft.com/office/drawing/2014/main" id="{BE71B780-2C04-469F-B96E-D146059E1696}"/>
+                </a:ext>
+              </a:extLst>
+            </p:cNvPr>
+            <p:cNvSpPr/>
+            <p:nvPr/>
+          </p:nvSpPr>
+          <p:spPr>
+            <a:xfrm rot="16200000">
+              <a:off x="6044785" y="5568166"/>
+              <a:ext cx="166513" cy="250155"/>
+            </a:xfrm>
+            <a:prstGeom prst="downArrow">
+              <a:avLst>
+                <a:gd name="adj1" fmla="val 33125"/>
+                <a:gd name="adj2" fmla="val 86898"/>
+              </a:avLst>
+            </a:prstGeom>
+            <a:solidFill>
+              <a:srgbClr val="2EB9F7"/>
+            </a:solidFill>
+            <a:ln>
+              <a:noFill/>
+            </a:ln>
+          </p:spPr>
+          <p:style>
+            <a:lnRef idx="2">
+              <a:schemeClr val="accent1">
+                <a:shade val="50000"/>
+              </a:schemeClr>
+            </a:lnRef>
+            <a:fillRef idx="1">
+              <a:schemeClr val="accent1"/>
+            </a:fillRef>
+            <a:effectRef idx="0">
+              <a:schemeClr val="accent1"/>
+            </a:effectRef>
+            <a:fontRef idx="minor">
+              <a:schemeClr val="lt1"/>
+            </a:fontRef>
+          </p:style>
+          <p:txBody>
+            <a:bodyPr rtlCol="0" anchor="ctr"/>
+            <a:lstStyle/>
+            <a:p>
+              <a:pPr algn="ctr"/>
+              <a:endParaRPr lang="en-DE"/>
+            </a:p>
+          </p:txBody>
+        </p:sp>
+      </p:grpSp>
+      <p:grpSp>
+        <p:nvGrpSpPr>
+          <p:cNvPr id="16" name="Group 15">
+            <a:extLst>
+              <a:ext uri="{FF2B5EF4-FFF2-40B4-BE49-F238E27FC236}">
+                <a16:creationId xmlns:a16="http://schemas.microsoft.com/office/drawing/2014/main" id="{66ABB59A-1979-4360-B0CA-ADF1F7F946E2}"/>
+              </a:ext>
+            </a:extLst>
+          </p:cNvPr>
+          <p:cNvGrpSpPr/>
+          <p:nvPr/>
+        </p:nvGrpSpPr>
+        <p:grpSpPr>
+          <a:xfrm>
+            <a:off x="6407950" y="5504758"/>
+            <a:ext cx="360000" cy="360000"/>
+            <a:chOff x="6519542" y="5513244"/>
+            <a:chExt cx="360000" cy="360000"/>
+          </a:xfrm>
+        </p:grpSpPr>
+        <p:sp>
+          <p:nvSpPr>
+            <p:cNvPr id="12" name="Rectangle: Rounded Corners 11">
+              <a:extLst>
+                <a:ext uri="{FF2B5EF4-FFF2-40B4-BE49-F238E27FC236}">
+                  <a16:creationId xmlns:a16="http://schemas.microsoft.com/office/drawing/2014/main" id="{AFD8ECFA-9E52-4766-B07B-35C05604640E}"/>
+                </a:ext>
+              </a:extLst>
+            </p:cNvPr>
+            <p:cNvSpPr/>
+            <p:nvPr/>
+          </p:nvSpPr>
+          <p:spPr>
+            <a:xfrm>
+              <a:off x="6519542" y="5513244"/>
+              <a:ext cx="360000" cy="360000"/>
+            </a:xfrm>
+            <a:prstGeom prst="roundRect">
+              <a:avLst>
+                <a:gd name="adj" fmla="val 7384"/>
+              </a:avLst>
+            </a:prstGeom>
+            <a:noFill/>
+            <a:ln w="57150">
+              <a:solidFill>
+                <a:srgbClr val="2EB9F7"/>
+              </a:solidFill>
+            </a:ln>
+          </p:spPr>
+          <p:style>
+            <a:lnRef idx="2">
+              <a:schemeClr val="accent1">
+                <a:shade val="50000"/>
+              </a:schemeClr>
+            </a:lnRef>
+            <a:fillRef idx="1">
+              <a:schemeClr val="accent1"/>
+            </a:fillRef>
+            <a:effectRef idx="0">
+              <a:schemeClr val="accent1"/>
+            </a:effectRef>
+            <a:fontRef idx="minor">
+              <a:schemeClr val="lt1"/>
+            </a:fontRef>
+          </p:style>
+          <p:txBody>
+            <a:bodyPr rtlCol="0" anchor="ctr"/>
+            <a:lstStyle/>
+            <a:p>
+              <a:pPr algn="ctr"/>
+              <a:endParaRPr lang="en-DE"/>
+            </a:p>
+          </p:txBody>
+        </p:sp>
+        <p:sp>
+          <p:nvSpPr>
+            <p:cNvPr id="13" name="Arrow: Down 12">
+              <a:extLst>
+                <a:ext uri="{FF2B5EF4-FFF2-40B4-BE49-F238E27FC236}">
+                  <a16:creationId xmlns:a16="http://schemas.microsoft.com/office/drawing/2014/main" id="{A2466733-CB45-43A8-BF6E-D6317E68668E}"/>
+                </a:ext>
+              </a:extLst>
+            </p:cNvPr>
+            <p:cNvSpPr/>
+            <p:nvPr/>
+          </p:nvSpPr>
+          <p:spPr>
+            <a:xfrm rot="5400000">
+              <a:off x="6616285" y="5568166"/>
+              <a:ext cx="166513" cy="250155"/>
+            </a:xfrm>
+            <a:prstGeom prst="downArrow">
+              <a:avLst>
+                <a:gd name="adj1" fmla="val 33125"/>
+                <a:gd name="adj2" fmla="val 86898"/>
+              </a:avLst>
+            </a:prstGeom>
+            <a:solidFill>
+              <a:srgbClr val="2EB9F7"/>
+            </a:solidFill>
+            <a:ln>
+              <a:noFill/>
+            </a:ln>
+          </p:spPr>
+          <p:style>
+            <a:lnRef idx="2">
+              <a:schemeClr val="accent1">
+                <a:shade val="50000"/>
+              </a:schemeClr>
+            </a:lnRef>
+            <a:fillRef idx="1">
+              <a:schemeClr val="accent1"/>
+            </a:fillRef>
+            <a:effectRef idx="0">
+              <a:schemeClr val="accent1"/>
+            </a:effectRef>
+            <a:fontRef idx="minor">
+              <a:schemeClr val="lt1"/>
+            </a:fontRef>
+          </p:style>
+          <p:txBody>
+            <a:bodyPr rtlCol="0" anchor="ctr"/>
+            <a:lstStyle/>
+            <a:p>
+              <a:pPr algn="ctr"/>
+              <a:endParaRPr lang="en-DE"/>
+            </a:p>
+          </p:txBody>
+        </p:sp>
+      </p:grpSp>
+      <p:grpSp>
+        <p:nvGrpSpPr>
+          <p:cNvPr id="22" name="Group 21">
+            <a:extLst>
+              <a:ext uri="{FF2B5EF4-FFF2-40B4-BE49-F238E27FC236}">
+                <a16:creationId xmlns:a16="http://schemas.microsoft.com/office/drawing/2014/main" id="{2A7C0108-B74A-4104-9006-6E8BC6B68E96}"/>
+              </a:ext>
+            </a:extLst>
+          </p:cNvPr>
+          <p:cNvGrpSpPr/>
+          <p:nvPr/>
+        </p:nvGrpSpPr>
+        <p:grpSpPr>
+          <a:xfrm>
+            <a:off x="6853380" y="5497424"/>
+            <a:ext cx="400979" cy="374668"/>
+            <a:chOff x="7106745" y="5494368"/>
+            <a:chExt cx="400979" cy="374668"/>
+          </a:xfrm>
+        </p:grpSpPr>
+        <p:sp>
+          <p:nvSpPr>
+            <p:cNvPr id="17" name="Rectangle 16">
+              <a:extLst>
+                <a:ext uri="{FF2B5EF4-FFF2-40B4-BE49-F238E27FC236}">
+                  <a16:creationId xmlns:a16="http://schemas.microsoft.com/office/drawing/2014/main" id="{F1E307C3-D9CE-4C61-BF43-B9E4742E98EE}"/>
+                </a:ext>
+              </a:extLst>
+            </p:cNvPr>
+            <p:cNvSpPr/>
+            <p:nvPr/>
+          </p:nvSpPr>
+          <p:spPr>
+            <a:xfrm>
+              <a:off x="7127237" y="5720714"/>
+              <a:ext cx="360000" cy="148321"/>
+            </a:xfrm>
+            <a:prstGeom prst="rect">
+              <a:avLst/>
+            </a:prstGeom>
+            <a:solidFill>
+              <a:srgbClr val="2EB9F7"/>
+            </a:solidFill>
+            <a:ln w="57150">
+              <a:solidFill>
+                <a:srgbClr val="2EB9F7"/>
+              </a:solidFill>
+            </a:ln>
+          </p:spPr>
+          <p:style>
+            <a:lnRef idx="2">
+              <a:schemeClr val="accent1">
+                <a:shade val="50000"/>
+              </a:schemeClr>
+            </a:lnRef>
+            <a:fillRef idx="1">
+              <a:schemeClr val="accent1"/>
+            </a:fillRef>
+            <a:effectRef idx="0">
+              <a:schemeClr val="accent1"/>
+            </a:effectRef>
+            <a:fontRef idx="minor">
+              <a:schemeClr val="lt1"/>
+            </a:fontRef>
+          </p:style>
+          <p:txBody>
+            <a:bodyPr rtlCol="0" anchor="ctr"/>
+            <a:lstStyle/>
+            <a:p>
+              <a:pPr algn="ctr"/>
+              <a:endParaRPr lang="en-DE"/>
+            </a:p>
+          </p:txBody>
+        </p:sp>
+        <p:sp>
+          <p:nvSpPr>
+            <p:cNvPr id="18" name="Oval 17">
+              <a:extLst>
+                <a:ext uri="{FF2B5EF4-FFF2-40B4-BE49-F238E27FC236}">
+                  <a16:creationId xmlns:a16="http://schemas.microsoft.com/office/drawing/2014/main" id="{56FA2B2B-2156-4741-9C67-8172D00659F5}"/>
+                </a:ext>
+              </a:extLst>
+            </p:cNvPr>
+            <p:cNvSpPr/>
+            <p:nvPr/>
+          </p:nvSpPr>
+          <p:spPr>
+            <a:xfrm>
+              <a:off x="7127236" y="5513244"/>
+              <a:ext cx="359999" cy="355792"/>
+            </a:xfrm>
+            <a:prstGeom prst="ellipse">
+              <a:avLst/>
+            </a:prstGeom>
+            <a:solidFill>
+              <a:srgbClr val="2EB9F7"/>
+            </a:solidFill>
+            <a:ln w="57150">
+              <a:solidFill>
+                <a:srgbClr val="2EB9F7"/>
+              </a:solidFill>
+            </a:ln>
+          </p:spPr>
+          <p:style>
+            <a:lnRef idx="2">
+              <a:schemeClr val="accent1">
+                <a:shade val="50000"/>
+              </a:schemeClr>
+            </a:lnRef>
+            <a:fillRef idx="1">
+              <a:schemeClr val="accent1"/>
+            </a:fillRef>
+            <a:effectRef idx="0">
+              <a:schemeClr val="accent1"/>
+            </a:effectRef>
+            <a:fontRef idx="minor">
+              <a:schemeClr val="lt1"/>
+            </a:fontRef>
+          </p:style>
+          <p:txBody>
+            <a:bodyPr rtlCol="0" anchor="ctr"/>
+            <a:lstStyle/>
+            <a:p>
+              <a:pPr algn="ctr"/>
+              <a:endParaRPr lang="en-DE"/>
+            </a:p>
+          </p:txBody>
+        </p:sp>
+        <p:sp>
+          <p:nvSpPr>
+            <p:cNvPr id="21" name="Partial Circle 20">
+              <a:extLst>
+                <a:ext uri="{FF2B5EF4-FFF2-40B4-BE49-F238E27FC236}">
+                  <a16:creationId xmlns:a16="http://schemas.microsoft.com/office/drawing/2014/main" id="{D1D232D8-0283-4D87-9F6F-EDFF1272200C}"/>
+                </a:ext>
+              </a:extLst>
+            </p:cNvPr>
+            <p:cNvSpPr/>
+            <p:nvPr/>
+          </p:nvSpPr>
+          <p:spPr>
+            <a:xfrm>
+              <a:off x="7106745" y="5494368"/>
+              <a:ext cx="400979" cy="360000"/>
+            </a:xfrm>
+            <a:prstGeom prst="pie">
+              <a:avLst>
+                <a:gd name="adj1" fmla="val 10783625"/>
+                <a:gd name="adj2" fmla="val 16200000"/>
+              </a:avLst>
+            </a:prstGeom>
+            <a:solidFill>
+              <a:schemeClr val="bg1"/>
+            </a:solidFill>
+            <a:ln w="12700">
+              <a:solidFill>
+                <a:srgbClr val="2EB9F7"/>
+              </a:solidFill>
+            </a:ln>
+          </p:spPr>
+          <p:style>
+            <a:lnRef idx="2">
+              <a:schemeClr val="accent1">
+                <a:shade val="50000"/>
+              </a:schemeClr>
+            </a:lnRef>
+            <a:fillRef idx="1">
+              <a:schemeClr val="accent1"/>
+            </a:fillRef>
+            <a:effectRef idx="0">
+              <a:schemeClr val="accent1"/>
+            </a:effectRef>
+            <a:fontRef idx="minor">
+              <a:schemeClr val="lt1"/>
+            </a:fontRef>
+          </p:style>
+          <p:txBody>
+            <a:bodyPr rtlCol="0" anchor="ctr"/>
+            <a:lstStyle/>
+            <a:p>
+              <a:pPr algn="ctr"/>
+              <a:endParaRPr lang="en-DE">
+                <a:solidFill>
+                  <a:schemeClr val="tx1"/>
+                </a:solidFill>
+              </a:endParaRPr>
+            </a:p>
+          </p:txBody>
+        </p:sp>
+      </p:grpSp>
     </p:spTree>
     <p:extLst>
       <p:ext uri="{BB962C8B-B14F-4D97-AF65-F5344CB8AC3E}">
         <p14:creationId xmlns:p14="http://schemas.microsoft.com/office/powerpoint/2010/main" val="2012085530"/>
+      </p:ext>
+    </p:extLst>
+  </p:cSld>
+  <p:clrMapOvr>
+    <a:masterClrMapping/>
+  </p:clrMapOvr>
+</p:sld>
+</file>
+
+<file path=ppt/slides/slide2.xml><?xml version="1.0" encoding="utf-8"?>
+<p:sld xmlns:a="http://schemas.openxmlformats.org/drawingml/2006/main" xmlns:r="http://schemas.openxmlformats.org/officeDocument/2006/relationships" xmlns:p="http://schemas.openxmlformats.org/presentationml/2006/main">
+  <p:cSld>
+    <p:spTree>
+      <p:nvGrpSpPr>
+        <p:cNvPr id="1" name=""/>
+        <p:cNvGrpSpPr/>
+        <p:nvPr/>
+      </p:nvGrpSpPr>
+      <p:grpSpPr>
+        <a:xfrm>
+          <a:off x="0" y="0"/>
+          <a:ext cx="0" cy="0"/>
+          <a:chOff x="0" y="0"/>
+          <a:chExt cx="0" cy="0"/>
+        </a:xfrm>
+      </p:grpSpPr>
+    </p:spTree>
+    <p:extLst>
+      <p:ext uri="{BB962C8B-B14F-4D97-AF65-F5344CB8AC3E}">
+        <p14:creationId xmlns:p14="http://schemas.microsoft.com/office/powerpoint/2010/main" val="3592870373"/>
       </p:ext>
     </p:extLst>
   </p:cSld>

</xml_diff>